<commit_message>
Slides 15&16 because these were somehow missed
</commit_message>
<xml_diff>
--- a/docs/progress_report/progress_report.pptx
+++ b/docs/progress_report/progress_report.pptx
@@ -241,7 +241,7 @@
           <a:p>
             <a:fld id="{FE5B4EDC-59C0-49C7-8ADA-5A781B329E02}" type="datetimeFigureOut">
               <a:rPr lang="en-US"/>
-              <a:t>12/5/2016</a:t>
+              <a:t>12/6/16</a:t>
             </a:fld>
             <a:endParaRPr/>
           </a:p>
@@ -406,7 +406,7 @@
           <a:p>
             <a:fld id="{F2D8D46A-B586-417D-BFBD-8C8FE0AAF762}" type="datetimeFigureOut">
               <a:rPr lang="en-US"/>
-              <a:t>12/5/2016</a:t>
+              <a:t>12/6/16</a:t>
             </a:fld>
             <a:endParaRPr/>
           </a:p>
@@ -748,7 +748,7 @@
               <a:rPr lang="en-US" smtClean="0"/>
               <a:t>2</a:t>
             </a:fld>
-            <a:endParaRPr lang="en-US"/>
+            <a:endParaRPr lang="en-US" dirty="0"/>
           </a:p>
         </p:txBody>
       </p:sp>
@@ -1521,7 +1521,7 @@
           <a:p>
             <a:fld id="{F0DFD029-FB74-4578-B929-F66AA97659CA}" type="datetimeFigureOut">
               <a:rPr lang="en-US"/>
-              <a:t>12/5/2016</a:t>
+              <a:t>12/6/16</a:t>
             </a:fld>
             <a:endParaRPr/>
           </a:p>
@@ -1719,7 +1719,7 @@
           <a:p>
             <a:fld id="{F0DFD029-FB74-4578-B929-F66AA97659CA}" type="datetimeFigureOut">
               <a:rPr lang="en-US"/>
-              <a:t>12/5/2016</a:t>
+              <a:t>12/6/16</a:t>
             </a:fld>
             <a:endParaRPr/>
           </a:p>
@@ -1927,7 +1927,7 @@
           <a:p>
             <a:fld id="{F0DFD029-FB74-4578-B929-F66AA97659CA}" type="datetimeFigureOut">
               <a:rPr lang="en-US"/>
-              <a:t>12/5/2016</a:t>
+              <a:t>12/6/16</a:t>
             </a:fld>
             <a:endParaRPr/>
           </a:p>
@@ -2125,7 +2125,7 @@
           <a:p>
             <a:fld id="{F0DFD029-FB74-4578-B929-F66AA97659CA}" type="datetimeFigureOut">
               <a:rPr lang="en-US"/>
-              <a:t>12/5/2016</a:t>
+              <a:t>12/6/16</a:t>
             </a:fld>
             <a:endParaRPr/>
           </a:p>
@@ -2557,7 +2557,7 @@
           <a:p>
             <a:fld id="{F0DFD029-FB74-4578-B929-F66AA97659CA}" type="datetimeFigureOut">
               <a:rPr lang="en-US"/>
-              <a:t>12/5/2016</a:t>
+              <a:t>12/6/16</a:t>
             </a:fld>
             <a:endParaRPr/>
           </a:p>
@@ -2861,7 +2861,7 @@
           <a:p>
             <a:fld id="{F0DFD029-FB74-4578-B929-F66AA97659CA}" type="datetimeFigureOut">
               <a:rPr lang="en-US"/>
-              <a:t>12/5/2016</a:t>
+              <a:t>12/6/16</a:t>
             </a:fld>
             <a:endParaRPr/>
           </a:p>
@@ -3317,7 +3317,7 @@
           <a:p>
             <a:fld id="{F0DFD029-FB74-4578-B929-F66AA97659CA}" type="datetimeFigureOut">
               <a:rPr lang="en-US"/>
-              <a:t>12/5/2016</a:t>
+              <a:t>12/6/16</a:t>
             </a:fld>
             <a:endParaRPr/>
           </a:p>
@@ -3447,7 +3447,7 @@
           <a:p>
             <a:fld id="{F0DFD029-FB74-4578-B929-F66AA97659CA}" type="datetimeFigureOut">
               <a:rPr lang="en-US"/>
-              <a:t>12/5/2016</a:t>
+              <a:t>12/6/16</a:t>
             </a:fld>
             <a:endParaRPr/>
           </a:p>
@@ -3554,7 +3554,7 @@
           <a:p>
             <a:fld id="{F0DFD029-FB74-4578-B929-F66AA97659CA}" type="datetimeFigureOut">
               <a:rPr lang="en-US"/>
-              <a:t>12/5/2016</a:t>
+              <a:t>12/6/16</a:t>
             </a:fld>
             <a:endParaRPr/>
           </a:p>
@@ -3853,7 +3853,7 @@
           <a:p>
             <a:fld id="{F0DFD029-FB74-4578-B929-F66AA97659CA}" type="datetimeFigureOut">
               <a:rPr lang="en-US"/>
-              <a:t>12/5/2016</a:t>
+              <a:t>12/6/16</a:t>
             </a:fld>
             <a:endParaRPr/>
           </a:p>
@@ -4117,10 +4117,10 @@
           </a:lstStyle>
           <a:p>
             <a:r>
-              <a:rPr lang="en-US"/>
+              <a:rPr lang="en-US" dirty="0"/>
               <a:t>Click icon to add picture</a:t>
             </a:r>
-            <a:endParaRPr/>
+            <a:endParaRPr dirty="0"/>
           </a:p>
         </p:txBody>
       </p:sp>
@@ -4141,7 +4141,7 @@
           <a:p>
             <a:fld id="{F0DFD029-FB74-4578-B929-F66AA97659CA}" type="datetimeFigureOut">
               <a:rPr lang="en-US"/>
-              <a:t>12/5/2016</a:t>
+              <a:t>12/6/16</a:t>
             </a:fld>
             <a:endParaRPr/>
           </a:p>
@@ -4764,7 +4764,7 @@
             <a:fld id="{F0DFD029-FB74-4578-B929-F66AA97659CA}" type="datetimeFigureOut">
               <a:rPr lang="en-US"/>
               <a:pPr/>
-              <a:t>12/5/2016</a:t>
+              <a:t>12/6/16</a:t>
             </a:fld>
             <a:endParaRPr/>
           </a:p>
@@ -5309,7 +5309,7 @@
               <a:t>Emily Longman, Zach Rogers, &amp; Dominic </a:t>
             </a:r>
             <a:r>
-              <a:rPr lang="en-US" sz="2800" dirty="0" err="1">
+              <a:rPr lang="en-US" sz="2800" dirty="0">
                 <a:solidFill>
                   <a:schemeClr val="tx2"/>
                 </a:solidFill>
@@ -5414,14 +5414,9 @@
               <a:buNone/>
             </a:pPr>
             <a:r>
-              <a:rPr lang="en-US" smtClean="0"/>
-              <a:t>Week </a:t>
-            </a:r>
-            <a:r>
-              <a:rPr lang="en-US" smtClean="0"/>
-              <a:t>0-3</a:t>
-            </a:r>
-            <a:endParaRPr lang="en-US" dirty="0" smtClean="0"/>
+              <a:rPr lang="en-US" dirty="0" smtClean="0"/>
+              <a:t>Week 0-3</a:t>
+            </a:r>
           </a:p>
           <a:p>
             <a:pPr marL="0" indent="0">
@@ -5441,7 +5436,7 @@
               <a:t>Met with client (V) and his clients (Professor </a:t>
             </a:r>
             <a:r>
-              <a:rPr lang="en-US" dirty="0" err="1"/>
+              <a:rPr lang="en-US" dirty="0"/>
               <a:t>Bobba</a:t>
             </a:r>
             <a:r>
@@ -5748,7 +5743,7 @@
               <a:t>	Along with midterms catching up to us, including </a:t>
             </a:r>
             <a:r>
-              <a:rPr lang="en-US" dirty="0" err="1"/>
+              <a:rPr lang="en-US" dirty="0"/>
               <a:t>Vee</a:t>
             </a:r>
             <a:r>
@@ -6043,7 +6038,7 @@
               <a:t>. Maintaining team communications. Particularly during midterms season, as not only are the 3 of us students, but </a:t>
             </a:r>
             <a:r>
-              <a:rPr lang="en-US" dirty="0" err="1"/>
+              <a:rPr lang="en-US" dirty="0"/>
               <a:t>Vee</a:t>
             </a:r>
             <a:r>
@@ -6155,14 +6150,28 @@
           <a:lstStyle/>
           <a:p>
             <a:r>
-              <a:rPr lang="en-US" dirty="0"/>
-              <a:t>What we want to change to do better</a:t>
-            </a:r>
-          </a:p>
-          <a:p>
-            <a:r>
-              <a:rPr lang="en-US" dirty="0"/>
-              <a:t>Essentially the deltas column</a:t>
+              <a:rPr lang="en-US" dirty="0" smtClean="0"/>
+              <a:t>Maintain a Consistent Meeting Schedule</a:t>
+            </a:r>
+          </a:p>
+          <a:p>
+            <a:pPr lvl="1"/>
+            <a:r>
+              <a:rPr lang="en-US" dirty="0" smtClean="0"/>
+              <a:t>For Winter and Spring Term, we aim to ensure that we are meeting at least once a week.</a:t>
+            </a:r>
+          </a:p>
+          <a:p>
+            <a:r>
+              <a:rPr lang="en-US" dirty="0" smtClean="0"/>
+              <a:t>Regular Check-ins with Professors</a:t>
+            </a:r>
+          </a:p>
+          <a:p>
+            <a:pPr lvl="1"/>
+            <a:r>
+              <a:rPr lang="en-US" dirty="0" smtClean="0"/>
+              <a:t>We plan to meet with professors and our client much earlier to discuss concerns regarding assignments and deadlines.</a:t>
             </a:r>
           </a:p>
         </p:txBody>
@@ -6247,15 +6256,69 @@
           <a:lstStyle/>
           <a:p>
             <a:r>
-              <a:rPr lang="en-US" dirty="0"/>
-              <a:t>Things that will be done over winter break</a:t>
-            </a:r>
-          </a:p>
-          <a:p>
-            <a:r>
-              <a:rPr lang="en-US" dirty="0"/>
-              <a:t>Any other future plans</a:t>
-            </a:r>
+              <a:rPr lang="en-US" dirty="0" smtClean="0"/>
+              <a:t>Over Winter Break We Will</a:t>
+            </a:r>
+          </a:p>
+          <a:p>
+            <a:pPr lvl="1"/>
+            <a:r>
+              <a:rPr lang="en-US" dirty="0" smtClean="0"/>
+              <a:t>Get our drones operational</a:t>
+            </a:r>
+          </a:p>
+          <a:p>
+            <a:pPr lvl="2"/>
+            <a:r>
+              <a:rPr lang="en-US" dirty="0" smtClean="0"/>
+              <a:t>Includes getting ROS running on our </a:t>
+            </a:r>
+            <a:r>
+              <a:rPr lang="en-US" dirty="0" err="1" smtClean="0"/>
+              <a:t>BeagleBone</a:t>
+            </a:r>
+            <a:r>
+              <a:rPr lang="en-US" dirty="0" smtClean="0"/>
+              <a:t>, and interface with our </a:t>
+            </a:r>
+            <a:r>
+              <a:rPr lang="en-US" dirty="0" err="1" smtClean="0"/>
+              <a:t>PixHawk</a:t>
+            </a:r>
+            <a:r>
+              <a:rPr lang="en-US" dirty="0" smtClean="0"/>
+              <a:t> cape</a:t>
+            </a:r>
+          </a:p>
+          <a:p>
+            <a:pPr lvl="2"/>
+            <a:r>
+              <a:rPr lang="en-US" dirty="0" smtClean="0"/>
+              <a:t>Seeing if SROS is something we can use </a:t>
+            </a:r>
+            <a:r>
+              <a:rPr lang="en-US" smtClean="0"/>
+              <a:t>moving forward</a:t>
+            </a:r>
+            <a:br>
+              <a:rPr lang="en-US" smtClean="0"/>
+            </a:br>
+            <a:endParaRPr lang="en-US" dirty="0"/>
+          </a:p>
+          <a:p>
+            <a:pPr lvl="1"/>
+            <a:r>
+              <a:rPr lang="en-US" dirty="0" smtClean="0"/>
+              <a:t>Start our Threat Modeling</a:t>
+            </a:r>
+          </a:p>
+          <a:p>
+            <a:pPr lvl="2"/>
+            <a:r>
+              <a:rPr lang="en-US" dirty="0" smtClean="0"/>
+              <a:t>Will allow us to get a head start to Winter term</a:t>
+            </a:r>
+            <a:endParaRPr lang="en-US" dirty="0" smtClean="0"/>
           </a:p>
         </p:txBody>
       </p:sp>
@@ -6354,7 +6417,7 @@
               <a:t> Zhang, </a:t>
             </a:r>
             <a:r>
-              <a:rPr lang="en-US" dirty="0" err="1"/>
+              <a:rPr lang="en-US" dirty="0"/>
               <a:t>Zhi</a:t>
             </a:r>
             <a:r>
@@ -6362,7 +6425,7 @@
               <a:t>-Kai, et al. "</a:t>
             </a:r>
             <a:r>
-              <a:rPr lang="en-US" dirty="0" err="1"/>
+              <a:rPr lang="en-US" dirty="0"/>
               <a:t>IoT</a:t>
             </a:r>
             <a:r>
@@ -6389,7 +6452,7 @@
               <a:t>S. Sharma, S. Garg, A. </a:t>
             </a:r>
             <a:r>
-              <a:rPr lang="en-US" dirty="0" err="1"/>
+              <a:rPr lang="en-US" dirty="0"/>
               <a:t>Karodiya</a:t>
             </a:r>
             <a:r>
@@ -6404,7 +6467,7 @@
               <a:t>[3] </a:t>
             </a:r>
             <a:r>
-              <a:rPr lang="en-US" dirty="0" err="1"/>
+              <a:rPr lang="en-US" dirty="0"/>
               <a:t>Samland</a:t>
             </a:r>
             <a:r>
@@ -6435,7 +6498,7 @@
               <a:t>ASQ. </a:t>
             </a:r>
             <a:r>
-              <a:rPr lang="fr-FR" dirty="0" err="1"/>
+              <a:rPr lang="fr-FR" dirty="0"/>
               <a:t>Failure</a:t>
             </a:r>
             <a:r>
@@ -6443,7 +6506,7 @@
               <a:t> mode </a:t>
             </a:r>
             <a:r>
-              <a:rPr lang="fr-FR" dirty="0" err="1"/>
+              <a:rPr lang="fr-FR" dirty="0"/>
               <a:t>effects</a:t>
             </a:r>
             <a:r>
@@ -6451,7 +6514,7 @@
               <a:t> </a:t>
             </a:r>
             <a:r>
-              <a:rPr lang="fr-FR" dirty="0" err="1"/>
+              <a:rPr lang="fr-FR" dirty="0"/>
               <a:t>analysis</a:t>
             </a:r>
             <a:r>
@@ -6459,7 +6522,7 @@
               <a:t>. [Online]. </a:t>
             </a:r>
             <a:r>
-              <a:rPr lang="fr-FR" dirty="0" err="1"/>
+              <a:rPr lang="fr-FR" dirty="0"/>
               <a:t>Available</a:t>
             </a:r>
             <a:r>
@@ -6490,7 +6553,7 @@
               <a:t>. </a:t>
             </a:r>
             <a:r>
-              <a:rPr lang="en-US" dirty="0" err="1"/>
+              <a:rPr lang="en-US" dirty="0"/>
               <a:t>Shostack</a:t>
             </a:r>
             <a:r>
@@ -6498,7 +6561,7 @@
               <a:t>, Threat Modeling, Designing for Security. Indianapolis, Indiana: John Wiley and Sons, </a:t>
             </a:r>
             <a:r>
-              <a:rPr lang="en-US" dirty="0" err="1"/>
+              <a:rPr lang="en-US" dirty="0"/>
               <a:t>Inc</a:t>
             </a:r>
             <a:r>
@@ -6704,7 +6767,9 @@
       </p:sp>
       <p:pic>
         <p:nvPicPr>
-          <p:cNvPr id="4" name="7u9hFluSkHc"/>
+          <p:cNvPr id="4" name="7u9hFluSkHc">
+            <a:hlinkClick r:id="" action="ppaction://ole?verb=0"/>
+          </p:cNvPr>
           <p:cNvPicPr>
             <a:picLocks noGrp="1" noRot="1" noChangeAspect="1"/>
           </p:cNvPicPr>
@@ -6754,7 +6819,80 @@
   <p:timing>
     <p:tnLst>
       <p:par>
-        <p:cTn id="1" dur="indefinite" restart="never" nodeType="tmRoot"/>
+        <p:cTn id="1" dur="indefinite" restart="never" nodeType="tmRoot">
+          <p:childTnLst>
+            <p:seq concurrent="1" nextAc="seek">
+              <p:cTn id="2" restart="whenNotActive" fill="hold" evtFilter="cancelBubble" nodeType="interactiveSeq">
+                <p:stCondLst>
+                  <p:cond evt="onClick" delay="0">
+                    <p:tgtEl>
+                      <p:spTgt spid="4"/>
+                    </p:tgtEl>
+                  </p:cond>
+                </p:stCondLst>
+                <p:endSync evt="end" delay="0">
+                  <p:rtn val="all"/>
+                </p:endSync>
+                <p:childTnLst>
+                  <p:par>
+                    <p:cTn id="3" fill="hold">
+                      <p:stCondLst>
+                        <p:cond delay="0"/>
+                      </p:stCondLst>
+                      <p:childTnLst>
+                        <p:par>
+                          <p:cTn id="4" fill="hold">
+                            <p:stCondLst>
+                              <p:cond delay="0"/>
+                            </p:stCondLst>
+                            <p:childTnLst>
+                              <p:par>
+                                <p:cTn id="5" presetID="2" presetClass="mediacall" presetSubtype="0" fill="hold" nodeType="clickEffect">
+                                  <p:stCondLst>
+                                    <p:cond delay="0"/>
+                                  </p:stCondLst>
+                                  <p:childTnLst>
+                                    <p:cmd type="call" cmd="togglePause">
+                                      <p:cBhvr>
+                                        <p:cTn id="6" dur="1" fill="hold"/>
+                                        <p:tgtEl>
+                                          <p:spTgt spid="4"/>
+                                        </p:tgtEl>
+                                      </p:cBhvr>
+                                    </p:cmd>
+                                  </p:childTnLst>
+                                </p:cTn>
+                              </p:par>
+                            </p:childTnLst>
+                          </p:cTn>
+                        </p:par>
+                      </p:childTnLst>
+                    </p:cTn>
+                  </p:par>
+                </p:childTnLst>
+              </p:cTn>
+              <p:nextCondLst>
+                <p:cond evt="onClick" delay="0">
+                  <p:tgtEl>
+                    <p:spTgt spid="4"/>
+                  </p:tgtEl>
+                </p:cond>
+              </p:nextCondLst>
+            </p:seq>
+            <p:video>
+              <p:cMediaNode>
+                <p:cTn id="7" fill="hold" display="0">
+                  <p:stCondLst>
+                    <p:cond delay="indefinite"/>
+                  </p:stCondLst>
+                </p:cTn>
+                <p:tgtEl>
+                  <p:spTgt spid="4"/>
+                </p:tgtEl>
+              </p:cMediaNode>
+            </p:video>
+          </p:childTnLst>
+        </p:cTn>
       </p:par>
     </p:tnLst>
   </p:timing>
@@ -6909,7 +7047,7 @@
           <a:lstStyle/>
           <a:p>
             <a:r>
-              <a:rPr lang="en-US" dirty="0" err="1"/>
+              <a:rPr lang="en-US" dirty="0"/>
               <a:t>IoT</a:t>
             </a:r>
             <a:r>
@@ -7226,7 +7364,15 @@
             <a:pPr lvl="1"/>
             <a:r>
               <a:rPr lang="en-US" dirty="0" smtClean="0"/>
-              <a:t>Using Adam Shostack’s guide </a:t>
+              <a:t>Using Adam </a:t>
+            </a:r>
+            <a:r>
+              <a:rPr lang="en-US" dirty="0" smtClean="0"/>
+              <a:t>Shostack’s</a:t>
+            </a:r>
+            <a:r>
+              <a:rPr lang="en-US" dirty="0" smtClean="0"/>
+              <a:t> guide </a:t>
             </a:r>
             <a:r>
               <a:rPr lang="en-US" baseline="30000" dirty="0" smtClean="0"/>

</xml_diff>

<commit_message>
Oops, we left a LaTeX style citation in our slide #sorrynotsorry
</commit_message>
<xml_diff>
--- a/docs/progress_report/progress_report.pptx
+++ b/docs/progress_report/progress_report.pptx
@@ -5306,21 +5306,8 @@
                   <a:schemeClr val="tx2"/>
                 </a:solidFill>
               </a:rPr>
-              <a:t>Emily Longman, Zach Rogers, &amp; Dominic </a:t>
-            </a:r>
-            <a:r>
-              <a:rPr lang="en-US" sz="2800" dirty="0">
-                <a:solidFill>
-                  <a:schemeClr val="tx2"/>
-                </a:solidFill>
-              </a:rPr>
-              <a:t>Giacoppe</a:t>
-            </a:r>
-            <a:endParaRPr lang="en-US" sz="2800" dirty="0">
-              <a:solidFill>
-                <a:schemeClr val="tx2"/>
-              </a:solidFill>
-            </a:endParaRPr>
+              <a:t>Emily Longman, Zach Rogers, &amp; Dominic Giacoppe</a:t>
+            </a:r>
           </a:p>
         </p:txBody>
       </p:sp>
@@ -5433,15 +5420,7 @@
             </a:pPr>
             <a:r>
               <a:rPr lang="en-US" dirty="0"/>
-              <a:t>Met with client (V) and his clients (Professor </a:t>
-            </a:r>
-            <a:r>
-              <a:rPr lang="en-US" dirty="0"/>
-              <a:t>Bobba</a:t>
-            </a:r>
-            <a:r>
-              <a:rPr lang="en-US" dirty="0"/>
-              <a:t> and resident crypto-expert Jesse) and discussed basic requirements</a:t>
+              <a:t>Met with client (V) and his clients (Professor Bobba and resident crypto-expert Jesse) and discussed basic requirements</a:t>
             </a:r>
           </a:p>
           <a:p>
@@ -5740,15 +5719,7 @@
             </a:pPr>
             <a:r>
               <a:rPr lang="en-US" dirty="0"/>
-              <a:t>	Along with midterms catching up to us, including </a:t>
-            </a:r>
-            <a:r>
-              <a:rPr lang="en-US" dirty="0"/>
-              <a:t>Vee</a:t>
-            </a:r>
-            <a:r>
-              <a:rPr lang="en-US" dirty="0"/>
-              <a:t>, which didn't help</a:t>
+              <a:t>	Along with midterms catching up to us, including Vee, which didn't help</a:t>
             </a:r>
           </a:p>
           <a:p>
@@ -6035,15 +6006,7 @@
             </a:r>
             <a:r>
               <a:rPr lang="en-US" dirty="0"/>
-              <a:t>. Maintaining team communications. Particularly during midterms season, as not only are the 3 of us students, but </a:t>
-            </a:r>
-            <a:r>
-              <a:rPr lang="en-US" dirty="0"/>
-              <a:t>Vee</a:t>
-            </a:r>
-            <a:r>
-              <a:rPr lang="en-US" dirty="0"/>
-              <a:t> as well, all progress and communication halted during that period while we scrambled to prepare for exams. This lead to our tech doc being late, which is inexcusable</a:t>
+              <a:t>. Maintaining team communications. Particularly during midterms season, as not only are the 3 of us students, but Vee as well, all progress and communication halted during that period while we scrambled to prepare for exams. This lead to our tech doc being late, which is inexcusable</a:t>
             </a:r>
             <a:r>
               <a:rPr lang="en-US" dirty="0" smtClean="0"/>
@@ -6318,7 +6281,6 @@
               <a:rPr lang="en-US" dirty="0" smtClean="0"/>
               <a:t>Will allow us to get a head start to Winter term</a:t>
             </a:r>
-            <a:endParaRPr lang="en-US" dirty="0" smtClean="0"/>
           </a:p>
         </p:txBody>
       </p:sp>
@@ -6414,23 +6376,7 @@
             </a:r>
             <a:r>
               <a:rPr lang="en-US" dirty="0"/>
-              <a:t> Zhang, </a:t>
-            </a:r>
-            <a:r>
-              <a:rPr lang="en-US" dirty="0"/>
-              <a:t>Zhi</a:t>
-            </a:r>
-            <a:r>
-              <a:rPr lang="en-US" dirty="0"/>
-              <a:t>-Kai, et al. "</a:t>
-            </a:r>
-            <a:r>
-              <a:rPr lang="en-US" dirty="0"/>
-              <a:t>IoT</a:t>
-            </a:r>
-            <a:r>
-              <a:rPr lang="en-US" dirty="0"/>
-              <a:t> security: ongoing challenges and research opportunities." </a:t>
+              <a:t> Zhang, Zhi-Kai, et al. "IoT security: ongoing challenges and research opportunities." </a:t>
             </a:r>
             <a:r>
               <a:rPr lang="en-US" dirty="0" smtClean="0"/>
@@ -6449,15 +6395,7 @@
             </a:r>
             <a:r>
               <a:rPr lang="en-US" dirty="0"/>
-              <a:t>S. Sharma, S. Garg, A. </a:t>
-            </a:r>
-            <a:r>
-              <a:rPr lang="en-US" dirty="0"/>
-              <a:t>Karodiya</a:t>
-            </a:r>
-            <a:r>
-              <a:rPr lang="en-US" dirty="0"/>
-              <a:t>, and H. Gupta, “Distributed denial of service attack.” </a:t>
+              <a:t>S. Sharma, S. Garg, A. Karodiya, and H. Gupta, “Distributed denial of service attack.” </a:t>
             </a:r>
             <a:endParaRPr lang="en-US" dirty="0" smtClean="0"/>
           </a:p>
@@ -6468,11 +6406,7 @@
             </a:r>
             <a:r>
               <a:rPr lang="en-US" dirty="0"/>
-              <a:t>Samland</a:t>
-            </a:r>
-            <a:r>
-              <a:rPr lang="en-US" dirty="0"/>
-              <a:t>, Fred, et al. "AR. Drone: security threat analysis and exemplary attack to track persons." </a:t>
+              <a:t>Samland, Fred, et al. "AR. Drone: security threat analysis and exemplary attack to track persons." </a:t>
             </a:r>
             <a:r>
               <a:rPr lang="en-US" dirty="0" smtClean="0"/>
@@ -6495,39 +6429,7 @@
             </a:r>
             <a:r>
               <a:rPr lang="fr-FR" dirty="0"/>
-              <a:t>ASQ. </a:t>
-            </a:r>
-            <a:r>
-              <a:rPr lang="fr-FR" dirty="0"/>
-              <a:t>Failure</a:t>
-            </a:r>
-            <a:r>
-              <a:rPr lang="fr-FR" dirty="0"/>
-              <a:t> mode </a:t>
-            </a:r>
-            <a:r>
-              <a:rPr lang="fr-FR" dirty="0"/>
-              <a:t>effects</a:t>
-            </a:r>
-            <a:r>
-              <a:rPr lang="fr-FR" dirty="0"/>
-              <a:t> </a:t>
-            </a:r>
-            <a:r>
-              <a:rPr lang="fr-FR" dirty="0"/>
-              <a:t>analysis</a:t>
-            </a:r>
-            <a:r>
-              <a:rPr lang="fr-FR" dirty="0"/>
-              <a:t>. [Online]. </a:t>
-            </a:r>
-            <a:r>
-              <a:rPr lang="fr-FR" dirty="0"/>
-              <a:t>Available</a:t>
-            </a:r>
-            <a:r>
-              <a:rPr lang="fr-FR" dirty="0"/>
-              <a:t>: </a:t>
+              <a:t>ASQ. Failure mode effects analysis. [Online]. Available: </a:t>
             </a:r>
             <a:r>
               <a:rPr lang="fr-FR" dirty="0">
@@ -6550,23 +6452,7 @@
             </a:r>
             <a:r>
               <a:rPr lang="en-US" dirty="0"/>
-              <a:t>. </a:t>
-            </a:r>
-            <a:r>
-              <a:rPr lang="en-US" dirty="0"/>
-              <a:t>Shostack</a:t>
-            </a:r>
-            <a:r>
-              <a:rPr lang="en-US" dirty="0"/>
-              <a:t>, Threat Modeling, Designing for Security. Indianapolis, Indiana: John Wiley and Sons, </a:t>
-            </a:r>
-            <a:r>
-              <a:rPr lang="en-US" dirty="0"/>
-              <a:t>Inc</a:t>
-            </a:r>
-            <a:r>
-              <a:rPr lang="en-US" dirty="0"/>
-              <a:t>, </a:t>
+              <a:t>. Shostack, Threat Modeling, Designing for Security. Indianapolis, Indiana: John Wiley and Sons, Inc, </a:t>
             </a:r>
             <a:r>
               <a:rPr lang="en-US" dirty="0" smtClean="0"/>
@@ -6689,8 +6575,17 @@
           <a:p>
             <a:r>
               <a:rPr lang="en-US" dirty="0"/>
-              <a:t>Potentially contribute those patches to the SROS project \cite </a:t>
-            </a:r>
+              <a:t>Potentially contribute those patches to the </a:t>
+            </a:r>
+            <a:r>
+              <a:rPr lang="en-US"/>
+              <a:t>SROS </a:t>
+            </a:r>
+            <a:r>
+              <a:rPr lang="en-US" smtClean="0"/>
+              <a:t>project</a:t>
+            </a:r>
+            <a:endParaRPr lang="en-US" dirty="0"/>
           </a:p>
         </p:txBody>
       </p:sp>
@@ -7048,11 +6943,7 @@
           <a:p>
             <a:r>
               <a:rPr lang="en-US" dirty="0"/>
-              <a:t>IoT</a:t>
-            </a:r>
-            <a:r>
-              <a:rPr lang="en-US" dirty="0"/>
-              <a:t> Security: Ongoing Challenges and Research </a:t>
+              <a:t>IoT Security: Ongoing Challenges and Research </a:t>
             </a:r>
             <a:r>
               <a:rPr lang="en-US" dirty="0" smtClean="0"/>
@@ -7364,15 +7255,7 @@
             <a:pPr lvl="1"/>
             <a:r>
               <a:rPr lang="en-US" dirty="0" smtClean="0"/>
-              <a:t>Using Adam </a:t>
-            </a:r>
-            <a:r>
-              <a:rPr lang="en-US" dirty="0" smtClean="0"/>
-              <a:t>Shostack’s</a:t>
-            </a:r>
-            <a:r>
-              <a:rPr lang="en-US" dirty="0" smtClean="0"/>
-              <a:t> guide </a:t>
+              <a:t>Using Adam Shostack’s guide </a:t>
             </a:r>
             <a:r>
               <a:rPr lang="en-US" baseline="30000" dirty="0" smtClean="0"/>

</xml_diff>